<commit_message>
Add six jet atomizer
</commit_message>
<xml_diff>
--- a/icons.pptx
+++ b/icons.pptx
@@ -264,7 +264,7 @@
           <a:p>
             <a:fld id="{1EB8CFBF-CDC5-4956-B865-DB8938F6B74E}" type="datetimeFigureOut">
               <a:rPr lang="en-CA" smtClean="0"/>
-              <a:t>2024-05-30</a:t>
+              <a:t>2024-06-03</a:t>
             </a:fld>
             <a:endParaRPr lang="en-CA"/>
           </a:p>
@@ -464,7 +464,7 @@
           <a:p>
             <a:fld id="{1EB8CFBF-CDC5-4956-B865-DB8938F6B74E}" type="datetimeFigureOut">
               <a:rPr lang="en-CA" smtClean="0"/>
-              <a:t>2024-05-30</a:t>
+              <a:t>2024-06-03</a:t>
             </a:fld>
             <a:endParaRPr lang="en-CA"/>
           </a:p>
@@ -674,7 +674,7 @@
           <a:p>
             <a:fld id="{1EB8CFBF-CDC5-4956-B865-DB8938F6B74E}" type="datetimeFigureOut">
               <a:rPr lang="en-CA" smtClean="0"/>
-              <a:t>2024-05-30</a:t>
+              <a:t>2024-06-03</a:t>
             </a:fld>
             <a:endParaRPr lang="en-CA"/>
           </a:p>
@@ -874,7 +874,7 @@
           <a:p>
             <a:fld id="{1EB8CFBF-CDC5-4956-B865-DB8938F6B74E}" type="datetimeFigureOut">
               <a:rPr lang="en-CA" smtClean="0"/>
-              <a:t>2024-05-30</a:t>
+              <a:t>2024-06-03</a:t>
             </a:fld>
             <a:endParaRPr lang="en-CA"/>
           </a:p>
@@ -1150,7 +1150,7 @@
           <a:p>
             <a:fld id="{1EB8CFBF-CDC5-4956-B865-DB8938F6B74E}" type="datetimeFigureOut">
               <a:rPr lang="en-CA" smtClean="0"/>
-              <a:t>2024-05-30</a:t>
+              <a:t>2024-06-03</a:t>
             </a:fld>
             <a:endParaRPr lang="en-CA"/>
           </a:p>
@@ -1418,7 +1418,7 @@
           <a:p>
             <a:fld id="{1EB8CFBF-CDC5-4956-B865-DB8938F6B74E}" type="datetimeFigureOut">
               <a:rPr lang="en-CA" smtClean="0"/>
-              <a:t>2024-05-30</a:t>
+              <a:t>2024-06-03</a:t>
             </a:fld>
             <a:endParaRPr lang="en-CA"/>
           </a:p>
@@ -1833,7 +1833,7 @@
           <a:p>
             <a:fld id="{1EB8CFBF-CDC5-4956-B865-DB8938F6B74E}" type="datetimeFigureOut">
               <a:rPr lang="en-CA" smtClean="0"/>
-              <a:t>2024-05-30</a:t>
+              <a:t>2024-06-03</a:t>
             </a:fld>
             <a:endParaRPr lang="en-CA"/>
           </a:p>
@@ -1975,7 +1975,7 @@
           <a:p>
             <a:fld id="{1EB8CFBF-CDC5-4956-B865-DB8938F6B74E}" type="datetimeFigureOut">
               <a:rPr lang="en-CA" smtClean="0"/>
-              <a:t>2024-05-30</a:t>
+              <a:t>2024-06-03</a:t>
             </a:fld>
             <a:endParaRPr lang="en-CA"/>
           </a:p>
@@ -2088,7 +2088,7 @@
           <a:p>
             <a:fld id="{1EB8CFBF-CDC5-4956-B865-DB8938F6B74E}" type="datetimeFigureOut">
               <a:rPr lang="en-CA" smtClean="0"/>
-              <a:t>2024-05-30</a:t>
+              <a:t>2024-06-03</a:t>
             </a:fld>
             <a:endParaRPr lang="en-CA"/>
           </a:p>
@@ -2401,7 +2401,7 @@
           <a:p>
             <a:fld id="{1EB8CFBF-CDC5-4956-B865-DB8938F6B74E}" type="datetimeFigureOut">
               <a:rPr lang="en-CA" smtClean="0"/>
-              <a:t>2024-05-30</a:t>
+              <a:t>2024-06-03</a:t>
             </a:fld>
             <a:endParaRPr lang="en-CA"/>
           </a:p>
@@ -2690,7 +2690,7 @@
           <a:p>
             <a:fld id="{1EB8CFBF-CDC5-4956-B865-DB8938F6B74E}" type="datetimeFigureOut">
               <a:rPr lang="en-CA" smtClean="0"/>
-              <a:t>2024-05-30</a:t>
+              <a:t>2024-06-03</a:t>
             </a:fld>
             <a:endParaRPr lang="en-CA"/>
           </a:p>
@@ -2933,7 +2933,7 @@
           <a:p>
             <a:fld id="{1EB8CFBF-CDC5-4956-B865-DB8938F6B74E}" type="datetimeFigureOut">
               <a:rPr lang="en-CA" smtClean="0"/>
-              <a:t>2024-05-30</a:t>
+              <a:t>2024-06-03</a:t>
             </a:fld>
             <a:endParaRPr lang="en-CA"/>
           </a:p>
@@ -20634,7 +20634,7 @@
         </p:nvGrpSpPr>
         <p:grpSpPr>
           <a:xfrm>
-            <a:off x="9880887" y="1448238"/>
+            <a:off x="9880887" y="1448239"/>
             <a:ext cx="1065241" cy="849789"/>
             <a:chOff x="8845550" y="3751551"/>
             <a:chExt cx="924983" cy="737899"/>
@@ -23804,6 +23804,1667 @@
           </a:p>
         </p:txBody>
       </p:sp>
+      <p:grpSp>
+        <p:nvGrpSpPr>
+          <p:cNvPr id="455" name="Group 454">
+            <a:extLst>
+              <a:ext uri="{FF2B5EF4-FFF2-40B4-BE49-F238E27FC236}">
+                <a16:creationId xmlns:a16="http://schemas.microsoft.com/office/drawing/2014/main" id="{B554162D-B186-FF9B-4A96-245946F24DB5}"/>
+              </a:ext>
+            </a:extLst>
+          </p:cNvPr>
+          <p:cNvGrpSpPr/>
+          <p:nvPr/>
+        </p:nvGrpSpPr>
+        <p:grpSpPr>
+          <a:xfrm>
+            <a:off x="1431386" y="3611689"/>
+            <a:ext cx="1292967" cy="945229"/>
+            <a:chOff x="6002020" y="3655000"/>
+            <a:chExt cx="1598774" cy="1168790"/>
+          </a:xfrm>
+        </p:grpSpPr>
+        <p:sp>
+          <p:nvSpPr>
+            <p:cNvPr id="454" name="Freeform: Shape 453">
+              <a:extLst>
+                <a:ext uri="{FF2B5EF4-FFF2-40B4-BE49-F238E27FC236}">
+                  <a16:creationId xmlns:a16="http://schemas.microsoft.com/office/drawing/2014/main" id="{86B1341C-3D76-E3A1-CA9E-D14441ABC487}"/>
+                </a:ext>
+              </a:extLst>
+            </p:cNvPr>
+            <p:cNvSpPr/>
+            <p:nvPr/>
+          </p:nvSpPr>
+          <p:spPr>
+            <a:xfrm>
+              <a:off x="6368746" y="3655000"/>
+              <a:ext cx="257522" cy="440287"/>
+            </a:xfrm>
+            <a:custGeom>
+              <a:avLst/>
+              <a:gdLst>
+                <a:gd name="connsiteX0" fmla="*/ 77434 w 209784"/>
+                <a:gd name="connsiteY0" fmla="*/ 0 h 416468"/>
+                <a:gd name="connsiteX1" fmla="*/ 132350 w 209784"/>
+                <a:gd name="connsiteY1" fmla="*/ 0 h 416468"/>
+                <a:gd name="connsiteX2" fmla="*/ 146079 w 209784"/>
+                <a:gd name="connsiteY2" fmla="*/ 13729 h 416468"/>
+                <a:gd name="connsiteX3" fmla="*/ 146079 w 209784"/>
+                <a:gd name="connsiteY3" fmla="*/ 85840 h 416468"/>
+                <a:gd name="connsiteX4" fmla="*/ 195075 w 209784"/>
+                <a:gd name="connsiteY4" fmla="*/ 170315 h 416468"/>
+                <a:gd name="connsiteX5" fmla="*/ 199543 w 209784"/>
+                <a:gd name="connsiteY5" fmla="*/ 172166 h 416468"/>
+                <a:gd name="connsiteX6" fmla="*/ 209784 w 209784"/>
+                <a:gd name="connsiteY6" fmla="*/ 196890 h 416468"/>
+                <a:gd name="connsiteX7" fmla="*/ 209784 w 209784"/>
+                <a:gd name="connsiteY7" fmla="*/ 381503 h 416468"/>
+                <a:gd name="connsiteX8" fmla="*/ 174819 w 209784"/>
+                <a:gd name="connsiteY8" fmla="*/ 416468 h 416468"/>
+                <a:gd name="connsiteX9" fmla="*/ 34965 w 209784"/>
+                <a:gd name="connsiteY9" fmla="*/ 416468 h 416468"/>
+                <a:gd name="connsiteX10" fmla="*/ 0 w 209784"/>
+                <a:gd name="connsiteY10" fmla="*/ 381503 h 416468"/>
+                <a:gd name="connsiteX11" fmla="*/ 0 w 209784"/>
+                <a:gd name="connsiteY11" fmla="*/ 196890 h 416468"/>
+                <a:gd name="connsiteX12" fmla="*/ 10241 w 209784"/>
+                <a:gd name="connsiteY12" fmla="*/ 172166 h 416468"/>
+                <a:gd name="connsiteX13" fmla="*/ 14709 w 209784"/>
+                <a:gd name="connsiteY13" fmla="*/ 170315 h 416468"/>
+                <a:gd name="connsiteX14" fmla="*/ 63705 w 209784"/>
+                <a:gd name="connsiteY14" fmla="*/ 85840 h 416468"/>
+                <a:gd name="connsiteX15" fmla="*/ 63705 w 209784"/>
+                <a:gd name="connsiteY15" fmla="*/ 13729 h 416468"/>
+                <a:gd name="connsiteX16" fmla="*/ 77434 w 209784"/>
+                <a:gd name="connsiteY16" fmla="*/ 0 h 416468"/>
+                <a:gd name="connsiteX0" fmla="*/ 77434 w 209784"/>
+                <a:gd name="connsiteY0" fmla="*/ 0 h 416468"/>
+                <a:gd name="connsiteX1" fmla="*/ 132350 w 209784"/>
+                <a:gd name="connsiteY1" fmla="*/ 0 h 416468"/>
+                <a:gd name="connsiteX2" fmla="*/ 146079 w 209784"/>
+                <a:gd name="connsiteY2" fmla="*/ 13729 h 416468"/>
+                <a:gd name="connsiteX3" fmla="*/ 146079 w 209784"/>
+                <a:gd name="connsiteY3" fmla="*/ 85840 h 416468"/>
+                <a:gd name="connsiteX4" fmla="*/ 199543 w 209784"/>
+                <a:gd name="connsiteY4" fmla="*/ 172166 h 416468"/>
+                <a:gd name="connsiteX5" fmla="*/ 209784 w 209784"/>
+                <a:gd name="connsiteY5" fmla="*/ 196890 h 416468"/>
+                <a:gd name="connsiteX6" fmla="*/ 209784 w 209784"/>
+                <a:gd name="connsiteY6" fmla="*/ 381503 h 416468"/>
+                <a:gd name="connsiteX7" fmla="*/ 174819 w 209784"/>
+                <a:gd name="connsiteY7" fmla="*/ 416468 h 416468"/>
+                <a:gd name="connsiteX8" fmla="*/ 34965 w 209784"/>
+                <a:gd name="connsiteY8" fmla="*/ 416468 h 416468"/>
+                <a:gd name="connsiteX9" fmla="*/ 0 w 209784"/>
+                <a:gd name="connsiteY9" fmla="*/ 381503 h 416468"/>
+                <a:gd name="connsiteX10" fmla="*/ 0 w 209784"/>
+                <a:gd name="connsiteY10" fmla="*/ 196890 h 416468"/>
+                <a:gd name="connsiteX11" fmla="*/ 10241 w 209784"/>
+                <a:gd name="connsiteY11" fmla="*/ 172166 h 416468"/>
+                <a:gd name="connsiteX12" fmla="*/ 14709 w 209784"/>
+                <a:gd name="connsiteY12" fmla="*/ 170315 h 416468"/>
+                <a:gd name="connsiteX13" fmla="*/ 63705 w 209784"/>
+                <a:gd name="connsiteY13" fmla="*/ 85840 h 416468"/>
+                <a:gd name="connsiteX14" fmla="*/ 63705 w 209784"/>
+                <a:gd name="connsiteY14" fmla="*/ 13729 h 416468"/>
+                <a:gd name="connsiteX15" fmla="*/ 77434 w 209784"/>
+                <a:gd name="connsiteY15" fmla="*/ 0 h 416468"/>
+                <a:gd name="connsiteX0" fmla="*/ 77434 w 209784"/>
+                <a:gd name="connsiteY0" fmla="*/ 0 h 416468"/>
+                <a:gd name="connsiteX1" fmla="*/ 132350 w 209784"/>
+                <a:gd name="connsiteY1" fmla="*/ 0 h 416468"/>
+                <a:gd name="connsiteX2" fmla="*/ 146079 w 209784"/>
+                <a:gd name="connsiteY2" fmla="*/ 13729 h 416468"/>
+                <a:gd name="connsiteX3" fmla="*/ 146079 w 209784"/>
+                <a:gd name="connsiteY3" fmla="*/ 85840 h 416468"/>
+                <a:gd name="connsiteX4" fmla="*/ 199543 w 209784"/>
+                <a:gd name="connsiteY4" fmla="*/ 172166 h 416468"/>
+                <a:gd name="connsiteX5" fmla="*/ 209784 w 209784"/>
+                <a:gd name="connsiteY5" fmla="*/ 196890 h 416468"/>
+                <a:gd name="connsiteX6" fmla="*/ 209784 w 209784"/>
+                <a:gd name="connsiteY6" fmla="*/ 381503 h 416468"/>
+                <a:gd name="connsiteX7" fmla="*/ 174819 w 209784"/>
+                <a:gd name="connsiteY7" fmla="*/ 416468 h 416468"/>
+                <a:gd name="connsiteX8" fmla="*/ 34965 w 209784"/>
+                <a:gd name="connsiteY8" fmla="*/ 416468 h 416468"/>
+                <a:gd name="connsiteX9" fmla="*/ 0 w 209784"/>
+                <a:gd name="connsiteY9" fmla="*/ 381503 h 416468"/>
+                <a:gd name="connsiteX10" fmla="*/ 0 w 209784"/>
+                <a:gd name="connsiteY10" fmla="*/ 196890 h 416468"/>
+                <a:gd name="connsiteX11" fmla="*/ 10241 w 209784"/>
+                <a:gd name="connsiteY11" fmla="*/ 172166 h 416468"/>
+                <a:gd name="connsiteX12" fmla="*/ 63705 w 209784"/>
+                <a:gd name="connsiteY12" fmla="*/ 85840 h 416468"/>
+                <a:gd name="connsiteX13" fmla="*/ 63705 w 209784"/>
+                <a:gd name="connsiteY13" fmla="*/ 13729 h 416468"/>
+                <a:gd name="connsiteX14" fmla="*/ 77434 w 209784"/>
+                <a:gd name="connsiteY14" fmla="*/ 0 h 416468"/>
+              </a:gdLst>
+              <a:ahLst/>
+              <a:cxnLst>
+                <a:cxn ang="0">
+                  <a:pos x="connsiteX0" y="connsiteY0"/>
+                </a:cxn>
+                <a:cxn ang="0">
+                  <a:pos x="connsiteX1" y="connsiteY1"/>
+                </a:cxn>
+                <a:cxn ang="0">
+                  <a:pos x="connsiteX2" y="connsiteY2"/>
+                </a:cxn>
+                <a:cxn ang="0">
+                  <a:pos x="connsiteX3" y="connsiteY3"/>
+                </a:cxn>
+                <a:cxn ang="0">
+                  <a:pos x="connsiteX4" y="connsiteY4"/>
+                </a:cxn>
+                <a:cxn ang="0">
+                  <a:pos x="connsiteX5" y="connsiteY5"/>
+                </a:cxn>
+                <a:cxn ang="0">
+                  <a:pos x="connsiteX6" y="connsiteY6"/>
+                </a:cxn>
+                <a:cxn ang="0">
+                  <a:pos x="connsiteX7" y="connsiteY7"/>
+                </a:cxn>
+                <a:cxn ang="0">
+                  <a:pos x="connsiteX8" y="connsiteY8"/>
+                </a:cxn>
+                <a:cxn ang="0">
+                  <a:pos x="connsiteX9" y="connsiteY9"/>
+                </a:cxn>
+                <a:cxn ang="0">
+                  <a:pos x="connsiteX10" y="connsiteY10"/>
+                </a:cxn>
+                <a:cxn ang="0">
+                  <a:pos x="connsiteX11" y="connsiteY11"/>
+                </a:cxn>
+                <a:cxn ang="0">
+                  <a:pos x="connsiteX12" y="connsiteY12"/>
+                </a:cxn>
+                <a:cxn ang="0">
+                  <a:pos x="connsiteX13" y="connsiteY13"/>
+                </a:cxn>
+                <a:cxn ang="0">
+                  <a:pos x="connsiteX14" y="connsiteY14"/>
+                </a:cxn>
+              </a:cxnLst>
+              <a:rect l="l" t="t" r="r" b="b"/>
+              <a:pathLst>
+                <a:path w="209784" h="416468">
+                  <a:moveTo>
+                    <a:pt x="77434" y="0"/>
+                  </a:moveTo>
+                  <a:lnTo>
+                    <a:pt x="132350" y="0"/>
+                  </a:lnTo>
+                  <a:cubicBezTo>
+                    <a:pt x="139932" y="0"/>
+                    <a:pt x="146079" y="6147"/>
+                    <a:pt x="146079" y="13729"/>
+                  </a:cubicBezTo>
+                  <a:lnTo>
+                    <a:pt x="146079" y="85840"/>
+                  </a:lnTo>
+                  <a:lnTo>
+                    <a:pt x="199543" y="172166"/>
+                  </a:lnTo>
+                  <a:cubicBezTo>
+                    <a:pt x="205871" y="178493"/>
+                    <a:pt x="209784" y="187235"/>
+                    <a:pt x="209784" y="196890"/>
+                  </a:cubicBezTo>
+                  <a:lnTo>
+                    <a:pt x="209784" y="381503"/>
+                  </a:lnTo>
+                  <a:cubicBezTo>
+                    <a:pt x="209784" y="400814"/>
+                    <a:pt x="194130" y="416468"/>
+                    <a:pt x="174819" y="416468"/>
+                  </a:cubicBezTo>
+                  <a:lnTo>
+                    <a:pt x="34965" y="416468"/>
+                  </a:lnTo>
+                  <a:cubicBezTo>
+                    <a:pt x="15654" y="416468"/>
+                    <a:pt x="0" y="400814"/>
+                    <a:pt x="0" y="381503"/>
+                  </a:cubicBezTo>
+                  <a:lnTo>
+                    <a:pt x="0" y="196890"/>
+                  </a:lnTo>
+                  <a:cubicBezTo>
+                    <a:pt x="0" y="187235"/>
+                    <a:pt x="3913" y="178493"/>
+                    <a:pt x="10241" y="172166"/>
+                  </a:cubicBezTo>
+                  <a:lnTo>
+                    <a:pt x="63705" y="85840"/>
+                  </a:lnTo>
+                  <a:lnTo>
+                    <a:pt x="63705" y="13729"/>
+                  </a:lnTo>
+                  <a:cubicBezTo>
+                    <a:pt x="63705" y="6147"/>
+                    <a:pt x="69852" y="0"/>
+                    <a:pt x="77434" y="0"/>
+                  </a:cubicBezTo>
+                  <a:close/>
+                </a:path>
+              </a:pathLst>
+            </a:custGeom>
+            <a:solidFill>
+              <a:schemeClr val="tx1"/>
+            </a:solidFill>
+          </p:spPr>
+          <p:style>
+            <a:lnRef idx="2">
+              <a:schemeClr val="accent1">
+                <a:shade val="15000"/>
+              </a:schemeClr>
+            </a:lnRef>
+            <a:fillRef idx="1">
+              <a:schemeClr val="accent1"/>
+            </a:fillRef>
+            <a:effectRef idx="0">
+              <a:schemeClr val="accent1"/>
+            </a:effectRef>
+            <a:fontRef idx="minor">
+              <a:schemeClr val="lt1"/>
+            </a:fontRef>
+          </p:style>
+          <p:txBody>
+            <a:bodyPr rtlCol="0" anchor="ctr"/>
+            <a:lstStyle/>
+            <a:p>
+              <a:pPr algn="ctr"/>
+              <a:endParaRPr lang="en-CA"/>
+            </a:p>
+          </p:txBody>
+        </p:sp>
+        <p:sp>
+          <p:nvSpPr>
+            <p:cNvPr id="7" name="Rectangle: Rounded Corners 6">
+              <a:extLst>
+                <a:ext uri="{FF2B5EF4-FFF2-40B4-BE49-F238E27FC236}">
+                  <a16:creationId xmlns:a16="http://schemas.microsoft.com/office/drawing/2014/main" id="{D7A8D04D-3D32-05AB-2538-AE67DAE49FC3}"/>
+                </a:ext>
+              </a:extLst>
+            </p:cNvPr>
+            <p:cNvSpPr/>
+            <p:nvPr/>
+          </p:nvSpPr>
+          <p:spPr>
+            <a:xfrm>
+              <a:off x="6002020" y="3986013"/>
+              <a:ext cx="1598774" cy="837777"/>
+            </a:xfrm>
+            <a:prstGeom prst="roundRect">
+              <a:avLst>
+                <a:gd name="adj" fmla="val 6569"/>
+              </a:avLst>
+            </a:prstGeom>
+            <a:solidFill>
+              <a:srgbClr val="D9D9D9"/>
+            </a:solidFill>
+            <a:ln w="19050" cap="flat">
+              <a:solidFill>
+                <a:srgbClr val="000000"/>
+              </a:solidFill>
+              <a:prstDash val="solid"/>
+              <a:round/>
+            </a:ln>
+          </p:spPr>
+          <p:txBody>
+            <a:bodyPr lIns="0" tIns="0" rIns="0" bIns="0" rtlCol="0" anchor="ctr"/>
+            <a:lstStyle/>
+            <a:p>
+              <a:endParaRPr lang="en-CA" sz="1000">
+                <a:solidFill>
+                  <a:schemeClr val="tx1"/>
+                </a:solidFill>
+              </a:endParaRPr>
+            </a:p>
+          </p:txBody>
+        </p:sp>
+        <p:grpSp>
+          <p:nvGrpSpPr>
+            <p:cNvPr id="25" name="Group 24">
+              <a:extLst>
+                <a:ext uri="{FF2B5EF4-FFF2-40B4-BE49-F238E27FC236}">
+                  <a16:creationId xmlns:a16="http://schemas.microsoft.com/office/drawing/2014/main" id="{62808983-0F00-FB46-B928-C381A39EB86B}"/>
+                </a:ext>
+              </a:extLst>
+            </p:cNvPr>
+            <p:cNvGrpSpPr/>
+            <p:nvPr/>
+          </p:nvGrpSpPr>
+          <p:grpSpPr>
+            <a:xfrm>
+              <a:off x="7306283" y="4152121"/>
+              <a:ext cx="217371" cy="217371"/>
+              <a:chOff x="7754247" y="3440218"/>
+              <a:chExt cx="217371" cy="217371"/>
+            </a:xfrm>
+          </p:grpSpPr>
+          <p:sp>
+            <p:nvSpPr>
+              <p:cNvPr id="13" name="Arc 12">
+                <a:extLst>
+                  <a:ext uri="{FF2B5EF4-FFF2-40B4-BE49-F238E27FC236}">
+                    <a16:creationId xmlns:a16="http://schemas.microsoft.com/office/drawing/2014/main" id="{5C65C522-BFF4-D33D-13CA-356DC32A97B6}"/>
+                  </a:ext>
+                </a:extLst>
+              </p:cNvPr>
+              <p:cNvSpPr/>
+              <p:nvPr/>
+            </p:nvSpPr>
+            <p:spPr>
+              <a:xfrm rot="18900000">
+                <a:off x="7774731" y="3460702"/>
+                <a:ext cx="176403" cy="176403"/>
+              </a:xfrm>
+              <a:prstGeom prst="arc">
+                <a:avLst/>
+              </a:prstGeom>
+              <a:ln w="19050" cap="rnd">
+                <a:solidFill>
+                  <a:schemeClr val="tx1"/>
+                </a:solidFill>
+              </a:ln>
+            </p:spPr>
+            <p:style>
+              <a:lnRef idx="1">
+                <a:schemeClr val="accent1"/>
+              </a:lnRef>
+              <a:fillRef idx="0">
+                <a:schemeClr val="accent1"/>
+              </a:fillRef>
+              <a:effectRef idx="0">
+                <a:schemeClr val="accent1"/>
+              </a:effectRef>
+              <a:fontRef idx="minor">
+                <a:schemeClr val="tx1"/>
+              </a:fontRef>
+            </p:style>
+            <p:txBody>
+              <a:bodyPr rtlCol="0" anchor="ctr"/>
+              <a:lstStyle/>
+              <a:p>
+                <a:pPr algn="ctr"/>
+                <a:endParaRPr lang="en-CA"/>
+              </a:p>
+            </p:txBody>
+          </p:sp>
+          <p:sp>
+            <p:nvSpPr>
+              <p:cNvPr id="14" name="Freeform: Shape 13">
+                <a:extLst>
+                  <a:ext uri="{FF2B5EF4-FFF2-40B4-BE49-F238E27FC236}">
+                    <a16:creationId xmlns:a16="http://schemas.microsoft.com/office/drawing/2014/main" id="{80E1A490-2117-88D8-2D3A-CAC899C398C2}"/>
+                  </a:ext>
+                </a:extLst>
+              </p:cNvPr>
+              <p:cNvSpPr/>
+              <p:nvPr/>
+            </p:nvSpPr>
+            <p:spPr>
+              <a:xfrm>
+                <a:off x="7754247" y="3440218"/>
+                <a:ext cx="217371" cy="217371"/>
+              </a:xfrm>
+              <a:custGeom>
+                <a:avLst/>
+                <a:gdLst>
+                  <a:gd name="connsiteX0" fmla="*/ 0 w 59780"/>
+                  <a:gd name="connsiteY0" fmla="*/ 32611 h 65221"/>
+                  <a:gd name="connsiteX1" fmla="*/ 29890 w 59780"/>
+                  <a:gd name="connsiteY1" fmla="*/ 0 h 65221"/>
+                  <a:gd name="connsiteX2" fmla="*/ 59781 w 59780"/>
+                  <a:gd name="connsiteY2" fmla="*/ 32611 h 65221"/>
+                  <a:gd name="connsiteX3" fmla="*/ 29890 w 59780"/>
+                  <a:gd name="connsiteY3" fmla="*/ 65221 h 65221"/>
+                  <a:gd name="connsiteX4" fmla="*/ 0 w 59780"/>
+                  <a:gd name="connsiteY4" fmla="*/ 32611 h 65221"/>
+                </a:gdLst>
+                <a:ahLst/>
+                <a:cxnLst>
+                  <a:cxn ang="0">
+                    <a:pos x="connsiteX0" y="connsiteY0"/>
+                  </a:cxn>
+                  <a:cxn ang="0">
+                    <a:pos x="connsiteX1" y="connsiteY1"/>
+                  </a:cxn>
+                  <a:cxn ang="0">
+                    <a:pos x="connsiteX2" y="connsiteY2"/>
+                  </a:cxn>
+                  <a:cxn ang="0">
+                    <a:pos x="connsiteX3" y="connsiteY3"/>
+                  </a:cxn>
+                  <a:cxn ang="0">
+                    <a:pos x="connsiteX4" y="connsiteY4"/>
+                  </a:cxn>
+                </a:cxnLst>
+                <a:rect l="l" t="t" r="r" b="b"/>
+                <a:pathLst>
+                  <a:path w="59780" h="65221">
+                    <a:moveTo>
+                      <a:pt x="0" y="32611"/>
+                    </a:moveTo>
+                    <a:cubicBezTo>
+                      <a:pt x="0" y="14599"/>
+                      <a:pt x="13380" y="0"/>
+                      <a:pt x="29890" y="0"/>
+                    </a:cubicBezTo>
+                    <a:cubicBezTo>
+                      <a:pt x="46401" y="0"/>
+                      <a:pt x="59781" y="14599"/>
+                      <a:pt x="59781" y="32611"/>
+                    </a:cubicBezTo>
+                    <a:cubicBezTo>
+                      <a:pt x="59781" y="50623"/>
+                      <a:pt x="46401" y="65221"/>
+                      <a:pt x="29890" y="65221"/>
+                    </a:cubicBezTo>
+                    <a:cubicBezTo>
+                      <a:pt x="13380" y="65221"/>
+                      <a:pt x="0" y="50623"/>
+                      <a:pt x="0" y="32611"/>
+                    </a:cubicBezTo>
+                    <a:close/>
+                  </a:path>
+                </a:pathLst>
+              </a:custGeom>
+              <a:solidFill>
+                <a:schemeClr val="bg1"/>
+              </a:solidFill>
+              <a:ln w="19050" cap="flat">
+                <a:solidFill>
+                  <a:srgbClr val="000000"/>
+                </a:solidFill>
+                <a:prstDash val="solid"/>
+                <a:round/>
+              </a:ln>
+            </p:spPr>
+            <p:txBody>
+              <a:bodyPr lIns="0" tIns="0" rIns="0" bIns="0" rtlCol="0" anchor="ctr"/>
+              <a:lstStyle/>
+              <a:p>
+                <a:endParaRPr lang="en-CA" sz="1000"/>
+              </a:p>
+            </p:txBody>
+          </p:sp>
+          <p:sp>
+            <p:nvSpPr>
+              <p:cNvPr id="17" name="Arc 16">
+                <a:extLst>
+                  <a:ext uri="{FF2B5EF4-FFF2-40B4-BE49-F238E27FC236}">
+                    <a16:creationId xmlns:a16="http://schemas.microsoft.com/office/drawing/2014/main" id="{D1C6A07F-C1BC-98B5-BF5C-44D57D65ADCF}"/>
+                  </a:ext>
+                </a:extLst>
+              </p:cNvPr>
+              <p:cNvSpPr/>
+              <p:nvPr/>
+            </p:nvSpPr>
+            <p:spPr>
+              <a:xfrm>
+                <a:off x="7799425" y="3485396"/>
+                <a:ext cx="127014" cy="127014"/>
+              </a:xfrm>
+              <a:prstGeom prst="arc">
+                <a:avLst/>
+              </a:prstGeom>
+              <a:ln w="19050" cap="rnd">
+                <a:solidFill>
+                  <a:schemeClr val="tx1"/>
+                </a:solidFill>
+              </a:ln>
+            </p:spPr>
+            <p:style>
+              <a:lnRef idx="1">
+                <a:schemeClr val="accent1"/>
+              </a:lnRef>
+              <a:fillRef idx="0">
+                <a:schemeClr val="accent1"/>
+              </a:fillRef>
+              <a:effectRef idx="0">
+                <a:schemeClr val="accent1"/>
+              </a:effectRef>
+              <a:fontRef idx="minor">
+                <a:schemeClr val="tx1"/>
+              </a:fontRef>
+            </p:style>
+            <p:txBody>
+              <a:bodyPr rtlCol="0" anchor="ctr"/>
+              <a:lstStyle/>
+              <a:p>
+                <a:pPr algn="ctr"/>
+                <a:endParaRPr lang="en-CA" dirty="0"/>
+              </a:p>
+            </p:txBody>
+          </p:sp>
+          <p:sp>
+            <p:nvSpPr>
+              <p:cNvPr id="18" name="Arc 17">
+                <a:extLst>
+                  <a:ext uri="{FF2B5EF4-FFF2-40B4-BE49-F238E27FC236}">
+                    <a16:creationId xmlns:a16="http://schemas.microsoft.com/office/drawing/2014/main" id="{98EBD3CA-C328-725F-689C-D852A01D3E37}"/>
+                  </a:ext>
+                </a:extLst>
+              </p:cNvPr>
+              <p:cNvSpPr/>
+              <p:nvPr/>
+            </p:nvSpPr>
+            <p:spPr>
+              <a:xfrm rot="10800000">
+                <a:off x="7799425" y="3485396"/>
+                <a:ext cx="127014" cy="127014"/>
+              </a:xfrm>
+              <a:prstGeom prst="arc">
+                <a:avLst/>
+              </a:prstGeom>
+              <a:ln w="19050" cap="rnd">
+                <a:solidFill>
+                  <a:schemeClr val="tx1"/>
+                </a:solidFill>
+              </a:ln>
+            </p:spPr>
+            <p:style>
+              <a:lnRef idx="1">
+                <a:schemeClr val="accent1"/>
+              </a:lnRef>
+              <a:fillRef idx="0">
+                <a:schemeClr val="accent1"/>
+              </a:fillRef>
+              <a:effectRef idx="0">
+                <a:schemeClr val="accent1"/>
+              </a:effectRef>
+              <a:fontRef idx="minor">
+                <a:schemeClr val="tx1"/>
+              </a:fontRef>
+            </p:style>
+            <p:txBody>
+              <a:bodyPr rtlCol="0" anchor="ctr"/>
+              <a:lstStyle/>
+              <a:p>
+                <a:pPr algn="ctr"/>
+                <a:endParaRPr lang="en-CA"/>
+              </a:p>
+            </p:txBody>
+          </p:sp>
+          <p:cxnSp>
+            <p:nvCxnSpPr>
+              <p:cNvPr id="20" name="Straight Connector 19">
+                <a:extLst>
+                  <a:ext uri="{FF2B5EF4-FFF2-40B4-BE49-F238E27FC236}">
+                    <a16:creationId xmlns:a16="http://schemas.microsoft.com/office/drawing/2014/main" id="{5BEF88C0-E98F-4E33-5F60-6EAA347DAD91}"/>
+                  </a:ext>
+                </a:extLst>
+              </p:cNvPr>
+              <p:cNvCxnSpPr>
+                <a:cxnSpLocks/>
+              </p:cNvCxnSpPr>
+              <p:nvPr/>
+            </p:nvCxnSpPr>
+            <p:spPr>
+              <a:xfrm>
+                <a:off x="7830157" y="3516128"/>
+                <a:ext cx="65551" cy="65550"/>
+              </a:xfrm>
+              <a:prstGeom prst="line">
+                <a:avLst/>
+              </a:prstGeom>
+              <a:ln w="19050" cap="rnd">
+                <a:solidFill>
+                  <a:schemeClr val="tx1"/>
+                </a:solidFill>
+              </a:ln>
+            </p:spPr>
+            <p:style>
+              <a:lnRef idx="1">
+                <a:schemeClr val="accent1"/>
+              </a:lnRef>
+              <a:fillRef idx="0">
+                <a:schemeClr val="accent1"/>
+              </a:fillRef>
+              <a:effectRef idx="0">
+                <a:schemeClr val="accent1"/>
+              </a:effectRef>
+              <a:fontRef idx="minor">
+                <a:schemeClr val="tx1"/>
+              </a:fontRef>
+            </p:style>
+          </p:cxnSp>
+        </p:grpSp>
+        <p:grpSp>
+          <p:nvGrpSpPr>
+            <p:cNvPr id="33" name="Group 32">
+              <a:extLst>
+                <a:ext uri="{FF2B5EF4-FFF2-40B4-BE49-F238E27FC236}">
+                  <a16:creationId xmlns:a16="http://schemas.microsoft.com/office/drawing/2014/main" id="{0F65869C-60A6-6854-8B29-F0641996B2AD}"/>
+                </a:ext>
+              </a:extLst>
+            </p:cNvPr>
+            <p:cNvGrpSpPr/>
+            <p:nvPr/>
+          </p:nvGrpSpPr>
+          <p:grpSpPr>
+            <a:xfrm rot="10800000">
+              <a:off x="6837907" y="4115889"/>
+              <a:ext cx="163220" cy="112142"/>
+              <a:chOff x="8702304" y="3875445"/>
+              <a:chExt cx="213901" cy="146963"/>
+            </a:xfrm>
+          </p:grpSpPr>
+          <p:sp>
+            <p:nvSpPr>
+              <p:cNvPr id="31" name="Freeform: Shape 30">
+                <a:extLst>
+                  <a:ext uri="{FF2B5EF4-FFF2-40B4-BE49-F238E27FC236}">
+                    <a16:creationId xmlns:a16="http://schemas.microsoft.com/office/drawing/2014/main" id="{0AA2EDF3-3DCC-BF07-BF45-9AA8B3D2870E}"/>
+                  </a:ext>
+                </a:extLst>
+              </p:cNvPr>
+              <p:cNvSpPr/>
+              <p:nvPr/>
+            </p:nvSpPr>
+            <p:spPr>
+              <a:xfrm>
+                <a:off x="8716203" y="3875445"/>
+                <a:ext cx="146964" cy="146963"/>
+              </a:xfrm>
+              <a:custGeom>
+                <a:avLst/>
+                <a:gdLst>
+                  <a:gd name="connsiteX0" fmla="*/ 0 w 59780"/>
+                  <a:gd name="connsiteY0" fmla="*/ 32611 h 65221"/>
+                  <a:gd name="connsiteX1" fmla="*/ 29890 w 59780"/>
+                  <a:gd name="connsiteY1" fmla="*/ 0 h 65221"/>
+                  <a:gd name="connsiteX2" fmla="*/ 59781 w 59780"/>
+                  <a:gd name="connsiteY2" fmla="*/ 32611 h 65221"/>
+                  <a:gd name="connsiteX3" fmla="*/ 29890 w 59780"/>
+                  <a:gd name="connsiteY3" fmla="*/ 65221 h 65221"/>
+                  <a:gd name="connsiteX4" fmla="*/ 0 w 59780"/>
+                  <a:gd name="connsiteY4" fmla="*/ 32611 h 65221"/>
+                </a:gdLst>
+                <a:ahLst/>
+                <a:cxnLst>
+                  <a:cxn ang="0">
+                    <a:pos x="connsiteX0" y="connsiteY0"/>
+                  </a:cxn>
+                  <a:cxn ang="0">
+                    <a:pos x="connsiteX1" y="connsiteY1"/>
+                  </a:cxn>
+                  <a:cxn ang="0">
+                    <a:pos x="connsiteX2" y="connsiteY2"/>
+                  </a:cxn>
+                  <a:cxn ang="0">
+                    <a:pos x="connsiteX3" y="connsiteY3"/>
+                  </a:cxn>
+                  <a:cxn ang="0">
+                    <a:pos x="connsiteX4" y="connsiteY4"/>
+                  </a:cxn>
+                </a:cxnLst>
+                <a:rect l="l" t="t" r="r" b="b"/>
+                <a:pathLst>
+                  <a:path w="59780" h="65221">
+                    <a:moveTo>
+                      <a:pt x="0" y="32611"/>
+                    </a:moveTo>
+                    <a:cubicBezTo>
+                      <a:pt x="0" y="14599"/>
+                      <a:pt x="13380" y="0"/>
+                      <a:pt x="29890" y="0"/>
+                    </a:cubicBezTo>
+                    <a:cubicBezTo>
+                      <a:pt x="46401" y="0"/>
+                      <a:pt x="59781" y="14599"/>
+                      <a:pt x="59781" y="32611"/>
+                    </a:cubicBezTo>
+                    <a:cubicBezTo>
+                      <a:pt x="59781" y="50623"/>
+                      <a:pt x="46401" y="65221"/>
+                      <a:pt x="29890" y="65221"/>
+                    </a:cubicBezTo>
+                    <a:cubicBezTo>
+                      <a:pt x="13380" y="65221"/>
+                      <a:pt x="0" y="50623"/>
+                      <a:pt x="0" y="32611"/>
+                    </a:cubicBezTo>
+                    <a:close/>
+                  </a:path>
+                </a:pathLst>
+              </a:custGeom>
+              <a:solidFill>
+                <a:srgbClr val="ECAE01"/>
+              </a:solidFill>
+              <a:ln w="19050" cap="flat">
+                <a:solidFill>
+                  <a:srgbClr val="000000"/>
+                </a:solidFill>
+                <a:prstDash val="solid"/>
+                <a:round/>
+              </a:ln>
+            </p:spPr>
+            <p:txBody>
+              <a:bodyPr rot="0" spcFirstLastPara="0" vertOverflow="overflow" horzOverflow="overflow" vert="horz" wrap="square" lIns="0" tIns="0" rIns="0" bIns="0" numCol="1" spcCol="0" rtlCol="0" fromWordArt="0" anchor="ctr" anchorCtr="0" forceAA="0" compatLnSpc="1">
+                <a:prstTxWarp prst="textNoShape">
+                  <a:avLst/>
+                </a:prstTxWarp>
+                <a:noAutofit/>
+              </a:bodyPr>
+              <a:lstStyle/>
+              <a:p>
+                <a:endParaRPr lang="en-CA" sz="1000"/>
+              </a:p>
+            </p:txBody>
+          </p:sp>
+          <p:sp>
+            <p:nvSpPr>
+              <p:cNvPr id="32" name="Rectangle: Rounded Corners 31">
+                <a:extLst>
+                  <a:ext uri="{FF2B5EF4-FFF2-40B4-BE49-F238E27FC236}">
+                    <a16:creationId xmlns:a16="http://schemas.microsoft.com/office/drawing/2014/main" id="{630D1607-A704-2087-0F0E-3608C4EB7E9B}"/>
+                  </a:ext>
+                </a:extLst>
+              </p:cNvPr>
+              <p:cNvSpPr/>
+              <p:nvPr/>
+            </p:nvSpPr>
+            <p:spPr>
+              <a:xfrm>
+                <a:off x="8702304" y="3923715"/>
+                <a:ext cx="213901" cy="50414"/>
+              </a:xfrm>
+              <a:prstGeom prst="roundRect">
+                <a:avLst>
+                  <a:gd name="adj" fmla="val 41953"/>
+                </a:avLst>
+              </a:prstGeom>
+              <a:solidFill>
+                <a:schemeClr val="tx1">
+                  <a:lumMod val="75000"/>
+                  <a:lumOff val="25000"/>
+                </a:schemeClr>
+              </a:solidFill>
+              <a:ln w="19050" cap="flat">
+                <a:solidFill>
+                  <a:srgbClr val="000000"/>
+                </a:solidFill>
+                <a:prstDash val="solid"/>
+                <a:round/>
+              </a:ln>
+            </p:spPr>
+            <p:txBody>
+              <a:bodyPr rot="0" spcFirstLastPara="0" vertOverflow="overflow" horzOverflow="overflow" vert="horz" wrap="square" lIns="0" tIns="0" rIns="0" bIns="0" numCol="1" spcCol="0" rtlCol="0" fromWordArt="0" anchor="ctr" anchorCtr="0" forceAA="0" compatLnSpc="1">
+                <a:prstTxWarp prst="textNoShape">
+                  <a:avLst/>
+                </a:prstTxWarp>
+                <a:noAutofit/>
+              </a:bodyPr>
+              <a:lstStyle/>
+              <a:p>
+                <a:endParaRPr lang="en-CA" sz="1000" dirty="0">
+                  <a:solidFill>
+                    <a:schemeClr val="tx1"/>
+                  </a:solidFill>
+                </a:endParaRPr>
+              </a:p>
+            </p:txBody>
+          </p:sp>
+        </p:grpSp>
+        <p:grpSp>
+          <p:nvGrpSpPr>
+            <p:cNvPr id="38" name="Group 37">
+              <a:extLst>
+                <a:ext uri="{FF2B5EF4-FFF2-40B4-BE49-F238E27FC236}">
+                  <a16:creationId xmlns:a16="http://schemas.microsoft.com/office/drawing/2014/main" id="{4F58E0C8-351B-EB39-62EF-0FAA1A9B0BAE}"/>
+                </a:ext>
+              </a:extLst>
+            </p:cNvPr>
+            <p:cNvGrpSpPr/>
+            <p:nvPr/>
+          </p:nvGrpSpPr>
+          <p:grpSpPr>
+            <a:xfrm rot="10800000">
+              <a:off x="6837907" y="4343037"/>
+              <a:ext cx="163220" cy="112142"/>
+              <a:chOff x="8702304" y="3875445"/>
+              <a:chExt cx="213901" cy="146963"/>
+            </a:xfrm>
+          </p:grpSpPr>
+          <p:sp>
+            <p:nvSpPr>
+              <p:cNvPr id="40" name="Freeform: Shape 39">
+                <a:extLst>
+                  <a:ext uri="{FF2B5EF4-FFF2-40B4-BE49-F238E27FC236}">
+                    <a16:creationId xmlns:a16="http://schemas.microsoft.com/office/drawing/2014/main" id="{DEE4D044-F009-3F3F-8C27-849ED52229BA}"/>
+                  </a:ext>
+                </a:extLst>
+              </p:cNvPr>
+              <p:cNvSpPr/>
+              <p:nvPr/>
+            </p:nvSpPr>
+            <p:spPr>
+              <a:xfrm>
+                <a:off x="8716203" y="3875445"/>
+                <a:ext cx="146964" cy="146963"/>
+              </a:xfrm>
+              <a:custGeom>
+                <a:avLst/>
+                <a:gdLst>
+                  <a:gd name="connsiteX0" fmla="*/ 0 w 59780"/>
+                  <a:gd name="connsiteY0" fmla="*/ 32611 h 65221"/>
+                  <a:gd name="connsiteX1" fmla="*/ 29890 w 59780"/>
+                  <a:gd name="connsiteY1" fmla="*/ 0 h 65221"/>
+                  <a:gd name="connsiteX2" fmla="*/ 59781 w 59780"/>
+                  <a:gd name="connsiteY2" fmla="*/ 32611 h 65221"/>
+                  <a:gd name="connsiteX3" fmla="*/ 29890 w 59780"/>
+                  <a:gd name="connsiteY3" fmla="*/ 65221 h 65221"/>
+                  <a:gd name="connsiteX4" fmla="*/ 0 w 59780"/>
+                  <a:gd name="connsiteY4" fmla="*/ 32611 h 65221"/>
+                </a:gdLst>
+                <a:ahLst/>
+                <a:cxnLst>
+                  <a:cxn ang="0">
+                    <a:pos x="connsiteX0" y="connsiteY0"/>
+                  </a:cxn>
+                  <a:cxn ang="0">
+                    <a:pos x="connsiteX1" y="connsiteY1"/>
+                  </a:cxn>
+                  <a:cxn ang="0">
+                    <a:pos x="connsiteX2" y="connsiteY2"/>
+                  </a:cxn>
+                  <a:cxn ang="0">
+                    <a:pos x="connsiteX3" y="connsiteY3"/>
+                  </a:cxn>
+                  <a:cxn ang="0">
+                    <a:pos x="connsiteX4" y="connsiteY4"/>
+                  </a:cxn>
+                </a:cxnLst>
+                <a:rect l="l" t="t" r="r" b="b"/>
+                <a:pathLst>
+                  <a:path w="59780" h="65221">
+                    <a:moveTo>
+                      <a:pt x="0" y="32611"/>
+                    </a:moveTo>
+                    <a:cubicBezTo>
+                      <a:pt x="0" y="14599"/>
+                      <a:pt x="13380" y="0"/>
+                      <a:pt x="29890" y="0"/>
+                    </a:cubicBezTo>
+                    <a:cubicBezTo>
+                      <a:pt x="46401" y="0"/>
+                      <a:pt x="59781" y="14599"/>
+                      <a:pt x="59781" y="32611"/>
+                    </a:cubicBezTo>
+                    <a:cubicBezTo>
+                      <a:pt x="59781" y="50623"/>
+                      <a:pt x="46401" y="65221"/>
+                      <a:pt x="29890" y="65221"/>
+                    </a:cubicBezTo>
+                    <a:cubicBezTo>
+                      <a:pt x="13380" y="65221"/>
+                      <a:pt x="0" y="50623"/>
+                      <a:pt x="0" y="32611"/>
+                    </a:cubicBezTo>
+                    <a:close/>
+                  </a:path>
+                </a:pathLst>
+              </a:custGeom>
+              <a:solidFill>
+                <a:srgbClr val="ECAE01"/>
+              </a:solidFill>
+              <a:ln w="19050" cap="flat">
+                <a:solidFill>
+                  <a:srgbClr val="000000"/>
+                </a:solidFill>
+                <a:prstDash val="solid"/>
+                <a:round/>
+              </a:ln>
+            </p:spPr>
+            <p:txBody>
+              <a:bodyPr rot="0" spcFirstLastPara="0" vertOverflow="overflow" horzOverflow="overflow" vert="horz" wrap="square" lIns="0" tIns="0" rIns="0" bIns="0" numCol="1" spcCol="0" rtlCol="0" fromWordArt="0" anchor="ctr" anchorCtr="0" forceAA="0" compatLnSpc="1">
+                <a:prstTxWarp prst="textNoShape">
+                  <a:avLst/>
+                </a:prstTxWarp>
+                <a:noAutofit/>
+              </a:bodyPr>
+              <a:lstStyle/>
+              <a:p>
+                <a:endParaRPr lang="en-CA" sz="1000"/>
+              </a:p>
+            </p:txBody>
+          </p:sp>
+          <p:sp>
+            <p:nvSpPr>
+              <p:cNvPr id="41" name="Rectangle: Rounded Corners 40">
+                <a:extLst>
+                  <a:ext uri="{FF2B5EF4-FFF2-40B4-BE49-F238E27FC236}">
+                    <a16:creationId xmlns:a16="http://schemas.microsoft.com/office/drawing/2014/main" id="{5FC69A60-CDB5-4F90-5835-F889C9CE0656}"/>
+                  </a:ext>
+                </a:extLst>
+              </p:cNvPr>
+              <p:cNvSpPr/>
+              <p:nvPr/>
+            </p:nvSpPr>
+            <p:spPr>
+              <a:xfrm>
+                <a:off x="8702304" y="3923715"/>
+                <a:ext cx="213901" cy="50414"/>
+              </a:xfrm>
+              <a:prstGeom prst="roundRect">
+                <a:avLst>
+                  <a:gd name="adj" fmla="val 41953"/>
+                </a:avLst>
+              </a:prstGeom>
+              <a:solidFill>
+                <a:schemeClr val="tx1">
+                  <a:lumMod val="75000"/>
+                  <a:lumOff val="25000"/>
+                </a:schemeClr>
+              </a:solidFill>
+              <a:ln w="19050" cap="flat">
+                <a:solidFill>
+                  <a:srgbClr val="000000"/>
+                </a:solidFill>
+                <a:prstDash val="solid"/>
+                <a:round/>
+              </a:ln>
+            </p:spPr>
+            <p:txBody>
+              <a:bodyPr rot="0" spcFirstLastPara="0" vertOverflow="overflow" horzOverflow="overflow" vert="horz" wrap="square" lIns="0" tIns="0" rIns="0" bIns="0" numCol="1" spcCol="0" rtlCol="0" fromWordArt="0" anchor="ctr" anchorCtr="0" forceAA="0" compatLnSpc="1">
+                <a:prstTxWarp prst="textNoShape">
+                  <a:avLst/>
+                </a:prstTxWarp>
+                <a:noAutofit/>
+              </a:bodyPr>
+              <a:lstStyle/>
+              <a:p>
+                <a:endParaRPr lang="en-CA" sz="1000" dirty="0">
+                  <a:solidFill>
+                    <a:schemeClr val="tx1"/>
+                  </a:solidFill>
+                </a:endParaRPr>
+              </a:p>
+            </p:txBody>
+          </p:sp>
+        </p:grpSp>
+        <p:grpSp>
+          <p:nvGrpSpPr>
+            <p:cNvPr id="42" name="Group 41">
+              <a:extLst>
+                <a:ext uri="{FF2B5EF4-FFF2-40B4-BE49-F238E27FC236}">
+                  <a16:creationId xmlns:a16="http://schemas.microsoft.com/office/drawing/2014/main" id="{4826793F-F24A-C8B9-08AD-5DF7686BEBF1}"/>
+                </a:ext>
+              </a:extLst>
+            </p:cNvPr>
+            <p:cNvGrpSpPr/>
+            <p:nvPr/>
+          </p:nvGrpSpPr>
+          <p:grpSpPr>
+            <a:xfrm rot="10800000">
+              <a:off x="6837907" y="4570186"/>
+              <a:ext cx="163220" cy="112142"/>
+              <a:chOff x="8702304" y="3875445"/>
+              <a:chExt cx="213901" cy="146963"/>
+            </a:xfrm>
+          </p:grpSpPr>
+          <p:sp>
+            <p:nvSpPr>
+              <p:cNvPr id="47" name="Freeform: Shape 46">
+                <a:extLst>
+                  <a:ext uri="{FF2B5EF4-FFF2-40B4-BE49-F238E27FC236}">
+                    <a16:creationId xmlns:a16="http://schemas.microsoft.com/office/drawing/2014/main" id="{061803D4-B942-4CA2-D21D-5DEC6AA1E521}"/>
+                  </a:ext>
+                </a:extLst>
+              </p:cNvPr>
+              <p:cNvSpPr/>
+              <p:nvPr/>
+            </p:nvSpPr>
+            <p:spPr>
+              <a:xfrm>
+                <a:off x="8716203" y="3875445"/>
+                <a:ext cx="146964" cy="146963"/>
+              </a:xfrm>
+              <a:custGeom>
+                <a:avLst/>
+                <a:gdLst>
+                  <a:gd name="connsiteX0" fmla="*/ 0 w 59780"/>
+                  <a:gd name="connsiteY0" fmla="*/ 32611 h 65221"/>
+                  <a:gd name="connsiteX1" fmla="*/ 29890 w 59780"/>
+                  <a:gd name="connsiteY1" fmla="*/ 0 h 65221"/>
+                  <a:gd name="connsiteX2" fmla="*/ 59781 w 59780"/>
+                  <a:gd name="connsiteY2" fmla="*/ 32611 h 65221"/>
+                  <a:gd name="connsiteX3" fmla="*/ 29890 w 59780"/>
+                  <a:gd name="connsiteY3" fmla="*/ 65221 h 65221"/>
+                  <a:gd name="connsiteX4" fmla="*/ 0 w 59780"/>
+                  <a:gd name="connsiteY4" fmla="*/ 32611 h 65221"/>
+                </a:gdLst>
+                <a:ahLst/>
+                <a:cxnLst>
+                  <a:cxn ang="0">
+                    <a:pos x="connsiteX0" y="connsiteY0"/>
+                  </a:cxn>
+                  <a:cxn ang="0">
+                    <a:pos x="connsiteX1" y="connsiteY1"/>
+                  </a:cxn>
+                  <a:cxn ang="0">
+                    <a:pos x="connsiteX2" y="connsiteY2"/>
+                  </a:cxn>
+                  <a:cxn ang="0">
+                    <a:pos x="connsiteX3" y="connsiteY3"/>
+                  </a:cxn>
+                  <a:cxn ang="0">
+                    <a:pos x="connsiteX4" y="connsiteY4"/>
+                  </a:cxn>
+                </a:cxnLst>
+                <a:rect l="l" t="t" r="r" b="b"/>
+                <a:pathLst>
+                  <a:path w="59780" h="65221">
+                    <a:moveTo>
+                      <a:pt x="0" y="32611"/>
+                    </a:moveTo>
+                    <a:cubicBezTo>
+                      <a:pt x="0" y="14599"/>
+                      <a:pt x="13380" y="0"/>
+                      <a:pt x="29890" y="0"/>
+                    </a:cubicBezTo>
+                    <a:cubicBezTo>
+                      <a:pt x="46401" y="0"/>
+                      <a:pt x="59781" y="14599"/>
+                      <a:pt x="59781" y="32611"/>
+                    </a:cubicBezTo>
+                    <a:cubicBezTo>
+                      <a:pt x="59781" y="50623"/>
+                      <a:pt x="46401" y="65221"/>
+                      <a:pt x="29890" y="65221"/>
+                    </a:cubicBezTo>
+                    <a:cubicBezTo>
+                      <a:pt x="13380" y="65221"/>
+                      <a:pt x="0" y="50623"/>
+                      <a:pt x="0" y="32611"/>
+                    </a:cubicBezTo>
+                    <a:close/>
+                  </a:path>
+                </a:pathLst>
+              </a:custGeom>
+              <a:solidFill>
+                <a:srgbClr val="ECAE01"/>
+              </a:solidFill>
+              <a:ln w="19050" cap="flat">
+                <a:solidFill>
+                  <a:srgbClr val="000000"/>
+                </a:solidFill>
+                <a:prstDash val="solid"/>
+                <a:round/>
+              </a:ln>
+            </p:spPr>
+            <p:txBody>
+              <a:bodyPr rot="0" spcFirstLastPara="0" vertOverflow="overflow" horzOverflow="overflow" vert="horz" wrap="square" lIns="0" tIns="0" rIns="0" bIns="0" numCol="1" spcCol="0" rtlCol="0" fromWordArt="0" anchor="ctr" anchorCtr="0" forceAA="0" compatLnSpc="1">
+                <a:prstTxWarp prst="textNoShape">
+                  <a:avLst/>
+                </a:prstTxWarp>
+                <a:noAutofit/>
+              </a:bodyPr>
+              <a:lstStyle/>
+              <a:p>
+                <a:endParaRPr lang="en-CA" sz="1000"/>
+              </a:p>
+            </p:txBody>
+          </p:sp>
+          <p:sp>
+            <p:nvSpPr>
+              <p:cNvPr id="48" name="Rectangle: Rounded Corners 47">
+                <a:extLst>
+                  <a:ext uri="{FF2B5EF4-FFF2-40B4-BE49-F238E27FC236}">
+                    <a16:creationId xmlns:a16="http://schemas.microsoft.com/office/drawing/2014/main" id="{A89C8F6F-6493-4F3C-FA5E-0EE2486F297A}"/>
+                  </a:ext>
+                </a:extLst>
+              </p:cNvPr>
+              <p:cNvSpPr/>
+              <p:nvPr/>
+            </p:nvSpPr>
+            <p:spPr>
+              <a:xfrm>
+                <a:off x="8702304" y="3923715"/>
+                <a:ext cx="213901" cy="50414"/>
+              </a:xfrm>
+              <a:prstGeom prst="roundRect">
+                <a:avLst>
+                  <a:gd name="adj" fmla="val 41953"/>
+                </a:avLst>
+              </a:prstGeom>
+              <a:solidFill>
+                <a:schemeClr val="tx1">
+                  <a:lumMod val="75000"/>
+                  <a:lumOff val="25000"/>
+                </a:schemeClr>
+              </a:solidFill>
+              <a:ln w="19050" cap="flat">
+                <a:solidFill>
+                  <a:srgbClr val="000000"/>
+                </a:solidFill>
+                <a:prstDash val="solid"/>
+                <a:round/>
+              </a:ln>
+            </p:spPr>
+            <p:txBody>
+              <a:bodyPr rot="0" spcFirstLastPara="0" vertOverflow="overflow" horzOverflow="overflow" vert="horz" wrap="square" lIns="0" tIns="0" rIns="0" bIns="0" numCol="1" spcCol="0" rtlCol="0" fromWordArt="0" anchor="ctr" anchorCtr="0" forceAA="0" compatLnSpc="1">
+                <a:prstTxWarp prst="textNoShape">
+                  <a:avLst/>
+                </a:prstTxWarp>
+                <a:noAutofit/>
+              </a:bodyPr>
+              <a:lstStyle/>
+              <a:p>
+                <a:endParaRPr lang="en-CA" sz="1000" dirty="0">
+                  <a:solidFill>
+                    <a:schemeClr val="tx1"/>
+                  </a:solidFill>
+                </a:endParaRPr>
+              </a:p>
+            </p:txBody>
+          </p:sp>
+        </p:grpSp>
+        <p:grpSp>
+          <p:nvGrpSpPr>
+            <p:cNvPr id="56" name="Group 55">
+              <a:extLst>
+                <a:ext uri="{FF2B5EF4-FFF2-40B4-BE49-F238E27FC236}">
+                  <a16:creationId xmlns:a16="http://schemas.microsoft.com/office/drawing/2014/main" id="{C3CA8037-D96F-9AA6-6D9D-1ABF42CF14BA}"/>
+                </a:ext>
+              </a:extLst>
+            </p:cNvPr>
+            <p:cNvGrpSpPr/>
+            <p:nvPr/>
+          </p:nvGrpSpPr>
+          <p:grpSpPr>
+            <a:xfrm>
+              <a:off x="7068445" y="4112872"/>
+              <a:ext cx="157948" cy="586126"/>
+              <a:chOff x="5493154" y="3729034"/>
+              <a:chExt cx="165059" cy="612513"/>
+            </a:xfrm>
+          </p:grpSpPr>
+          <p:sp>
+            <p:nvSpPr>
+              <p:cNvPr id="49" name="Rectangle: Rounded Corners 48">
+                <a:extLst>
+                  <a:ext uri="{FF2B5EF4-FFF2-40B4-BE49-F238E27FC236}">
+                    <a16:creationId xmlns:a16="http://schemas.microsoft.com/office/drawing/2014/main" id="{F38736C3-754C-79AC-6511-B39E68B90249}"/>
+                  </a:ext>
+                </a:extLst>
+              </p:cNvPr>
+              <p:cNvSpPr/>
+              <p:nvPr/>
+            </p:nvSpPr>
+            <p:spPr>
+              <a:xfrm>
+                <a:off x="5493154" y="3729034"/>
+                <a:ext cx="165059" cy="612513"/>
+              </a:xfrm>
+              <a:prstGeom prst="roundRect">
+                <a:avLst/>
+              </a:prstGeom>
+              <a:solidFill>
+                <a:schemeClr val="bg1">
+                  <a:lumMod val="75000"/>
+                </a:schemeClr>
+              </a:solidFill>
+              <a:ln w="19050" cap="flat">
+                <a:solidFill>
+                  <a:schemeClr val="tx1"/>
+                </a:solidFill>
+                <a:prstDash val="solid"/>
+                <a:round/>
+              </a:ln>
+            </p:spPr>
+            <p:txBody>
+              <a:bodyPr lIns="0" tIns="0" rIns="0" bIns="0" rtlCol="0" anchor="ctr"/>
+              <a:lstStyle/>
+              <a:p>
+                <a:endParaRPr lang="en-CA" sz="1000">
+                  <a:solidFill>
+                    <a:schemeClr val="tx1"/>
+                  </a:solidFill>
+                </a:endParaRPr>
+              </a:p>
+            </p:txBody>
+          </p:sp>
+          <p:cxnSp>
+            <p:nvCxnSpPr>
+              <p:cNvPr id="54" name="Straight Connector 53">
+                <a:extLst>
+                  <a:ext uri="{FF2B5EF4-FFF2-40B4-BE49-F238E27FC236}">
+                    <a16:creationId xmlns:a16="http://schemas.microsoft.com/office/drawing/2014/main" id="{4D900A3B-318A-717D-9F52-6DA12DB8B88F}"/>
+                  </a:ext>
+                </a:extLst>
+              </p:cNvPr>
+              <p:cNvCxnSpPr>
+                <a:cxnSpLocks/>
+              </p:cNvCxnSpPr>
+              <p:nvPr/>
+            </p:nvCxnSpPr>
+            <p:spPr>
+              <a:xfrm flipV="1">
+                <a:off x="5575670" y="3961449"/>
+                <a:ext cx="0" cy="289897"/>
+              </a:xfrm>
+              <a:prstGeom prst="line">
+                <a:avLst/>
+              </a:prstGeom>
+              <a:ln w="19050" cap="rnd">
+                <a:solidFill>
+                  <a:schemeClr val="tx1"/>
+                </a:solidFill>
+              </a:ln>
+            </p:spPr>
+            <p:style>
+              <a:lnRef idx="1">
+                <a:schemeClr val="accent1"/>
+              </a:lnRef>
+              <a:fillRef idx="0">
+                <a:schemeClr val="accent1"/>
+              </a:fillRef>
+              <a:effectRef idx="0">
+                <a:schemeClr val="accent1"/>
+              </a:effectRef>
+              <a:fontRef idx="minor">
+                <a:schemeClr val="tx1"/>
+              </a:fontRef>
+            </p:style>
+          </p:cxnSp>
+          <p:sp>
+            <p:nvSpPr>
+              <p:cNvPr id="51" name="Oval 50">
+                <a:extLst>
+                  <a:ext uri="{FF2B5EF4-FFF2-40B4-BE49-F238E27FC236}">
+                    <a16:creationId xmlns:a16="http://schemas.microsoft.com/office/drawing/2014/main" id="{E92BE5ED-3C6D-1A5D-FAE5-A69EFCC5CBDB}"/>
+                  </a:ext>
+                </a:extLst>
+              </p:cNvPr>
+              <p:cNvSpPr/>
+              <p:nvPr/>
+            </p:nvSpPr>
+            <p:spPr>
+              <a:xfrm>
+                <a:off x="5539578" y="4227065"/>
+                <a:ext cx="72186" cy="72186"/>
+              </a:xfrm>
+              <a:prstGeom prst="ellipse">
+                <a:avLst/>
+              </a:prstGeom>
+              <a:solidFill>
+                <a:schemeClr val="tx1">
+                  <a:lumMod val="75000"/>
+                  <a:lumOff val="25000"/>
+                </a:schemeClr>
+              </a:solidFill>
+              <a:ln w="19050" cap="flat">
+                <a:solidFill>
+                  <a:schemeClr val="tx1"/>
+                </a:solidFill>
+                <a:prstDash val="solid"/>
+                <a:round/>
+              </a:ln>
+            </p:spPr>
+            <p:txBody>
+              <a:bodyPr rot="0" spcFirstLastPara="0" vertOverflow="overflow" horzOverflow="overflow" vert="horz" wrap="square" lIns="0" tIns="0" rIns="0" bIns="0" numCol="1" spcCol="0" rtlCol="0" fromWordArt="0" anchor="ctr" anchorCtr="0" forceAA="0" compatLnSpc="1">
+                <a:prstTxWarp prst="textNoShape">
+                  <a:avLst/>
+                </a:prstTxWarp>
+                <a:noAutofit/>
+              </a:bodyPr>
+              <a:lstStyle/>
+              <a:p>
+                <a:endParaRPr lang="en-CA" sz="1000" dirty="0">
+                  <a:solidFill>
+                    <a:schemeClr val="tx1"/>
+                  </a:solidFill>
+                </a:endParaRPr>
+              </a:p>
+            </p:txBody>
+          </p:sp>
+        </p:grpSp>
+        <p:sp>
+          <p:nvSpPr>
+            <p:cNvPr id="57" name="Diamond 56">
+              <a:extLst>
+                <a:ext uri="{FF2B5EF4-FFF2-40B4-BE49-F238E27FC236}">
+                  <a16:creationId xmlns:a16="http://schemas.microsoft.com/office/drawing/2014/main" id="{FCCE3D09-1CEC-1C10-D86E-C81D224F5EE9}"/>
+                </a:ext>
+              </a:extLst>
+            </p:cNvPr>
+            <p:cNvSpPr/>
+            <p:nvPr/>
+          </p:nvSpPr>
+          <p:spPr>
+            <a:xfrm>
+              <a:off x="6518254" y="4123805"/>
+              <a:ext cx="92075" cy="92075"/>
+            </a:xfrm>
+            <a:prstGeom prst="diamond">
+              <a:avLst/>
+            </a:prstGeom>
+            <a:solidFill>
+              <a:schemeClr val="tx1"/>
+            </a:solidFill>
+            <a:ln w="19050" cap="rnd">
+              <a:solidFill>
+                <a:schemeClr val="tx1"/>
+              </a:solidFill>
+              <a:round/>
+            </a:ln>
+          </p:spPr>
+          <p:style>
+            <a:lnRef idx="2">
+              <a:schemeClr val="accent1">
+                <a:shade val="50000"/>
+              </a:schemeClr>
+            </a:lnRef>
+            <a:fillRef idx="1">
+              <a:schemeClr val="accent1"/>
+            </a:fillRef>
+            <a:effectRef idx="0">
+              <a:schemeClr val="accent1"/>
+            </a:effectRef>
+            <a:fontRef idx="minor">
+              <a:schemeClr val="lt1"/>
+            </a:fontRef>
+          </p:style>
+          <p:txBody>
+            <a:bodyPr wrap="square" rtlCol="0" anchor="ctr">
+              <a:noAutofit/>
+            </a:bodyPr>
+            <a:lstStyle/>
+            <a:p>
+              <a:pPr algn="ctr"/>
+              <a:endParaRPr lang="en-CA" sz="4400">
+                <a:cs typeface="Arial" panose="020B0604020202020204" pitchFamily="34" charset="0"/>
+              </a:endParaRPr>
+            </a:p>
+          </p:txBody>
+        </p:sp>
+        <p:cxnSp>
+          <p:nvCxnSpPr>
+            <p:cNvPr id="59" name="Straight Connector 58">
+              <a:extLst>
+                <a:ext uri="{FF2B5EF4-FFF2-40B4-BE49-F238E27FC236}">
+                  <a16:creationId xmlns:a16="http://schemas.microsoft.com/office/drawing/2014/main" id="{93518668-DEEF-BA2F-DD64-3129EB4CB0D1}"/>
+                </a:ext>
+              </a:extLst>
+            </p:cNvPr>
+            <p:cNvCxnSpPr>
+              <a:cxnSpLocks/>
+            </p:cNvCxnSpPr>
+            <p:nvPr/>
+          </p:nvCxnSpPr>
+          <p:spPr>
+            <a:xfrm>
+              <a:off x="6455799" y="4253666"/>
+              <a:ext cx="216984" cy="0"/>
+            </a:xfrm>
+            <a:prstGeom prst="line">
+              <a:avLst/>
+            </a:prstGeom>
+            <a:ln w="19050" cap="rnd">
+              <a:solidFill>
+                <a:schemeClr val="tx1"/>
+              </a:solidFill>
+            </a:ln>
+          </p:spPr>
+          <p:style>
+            <a:lnRef idx="1">
+              <a:schemeClr val="accent1"/>
+            </a:lnRef>
+            <a:fillRef idx="0">
+              <a:schemeClr val="accent1"/>
+            </a:fillRef>
+            <a:effectRef idx="0">
+              <a:schemeClr val="accent1"/>
+            </a:effectRef>
+            <a:fontRef idx="minor">
+              <a:schemeClr val="tx1"/>
+            </a:fontRef>
+          </p:style>
+        </p:cxnSp>
+        <p:grpSp>
+          <p:nvGrpSpPr>
+            <p:cNvPr id="61" name="Group 60">
+              <a:extLst>
+                <a:ext uri="{FF2B5EF4-FFF2-40B4-BE49-F238E27FC236}">
+                  <a16:creationId xmlns:a16="http://schemas.microsoft.com/office/drawing/2014/main" id="{38FB7574-BC02-2E51-E4BC-78438CE071FD}"/>
+                </a:ext>
+              </a:extLst>
+            </p:cNvPr>
+            <p:cNvGrpSpPr/>
+            <p:nvPr/>
+          </p:nvGrpSpPr>
+          <p:grpSpPr>
+            <a:xfrm>
+              <a:off x="6127921" y="4112872"/>
+              <a:ext cx="157948" cy="586126"/>
+              <a:chOff x="5493154" y="3729034"/>
+              <a:chExt cx="165059" cy="612513"/>
+            </a:xfrm>
+          </p:grpSpPr>
+          <p:sp>
+            <p:nvSpPr>
+              <p:cNvPr id="62" name="Rectangle: Rounded Corners 61">
+                <a:extLst>
+                  <a:ext uri="{FF2B5EF4-FFF2-40B4-BE49-F238E27FC236}">
+                    <a16:creationId xmlns:a16="http://schemas.microsoft.com/office/drawing/2014/main" id="{75565510-51EA-CA37-B747-68F6AA8FCDA1}"/>
+                  </a:ext>
+                </a:extLst>
+              </p:cNvPr>
+              <p:cNvSpPr/>
+              <p:nvPr/>
+            </p:nvSpPr>
+            <p:spPr>
+              <a:xfrm>
+                <a:off x="5493154" y="3729034"/>
+                <a:ext cx="165059" cy="612513"/>
+              </a:xfrm>
+              <a:prstGeom prst="roundRect">
+                <a:avLst/>
+              </a:prstGeom>
+              <a:solidFill>
+                <a:schemeClr val="bg1">
+                  <a:lumMod val="75000"/>
+                </a:schemeClr>
+              </a:solidFill>
+              <a:ln w="19050" cap="flat">
+                <a:solidFill>
+                  <a:schemeClr val="tx1"/>
+                </a:solidFill>
+                <a:prstDash val="solid"/>
+                <a:round/>
+              </a:ln>
+            </p:spPr>
+            <p:txBody>
+              <a:bodyPr lIns="0" tIns="0" rIns="0" bIns="0" rtlCol="0" anchor="ctr"/>
+              <a:lstStyle/>
+              <a:p>
+                <a:endParaRPr lang="en-CA" sz="1000">
+                  <a:solidFill>
+                    <a:schemeClr val="tx1"/>
+                  </a:solidFill>
+                </a:endParaRPr>
+              </a:p>
+            </p:txBody>
+          </p:sp>
+          <p:sp>
+            <p:nvSpPr>
+              <p:cNvPr id="450" name="Rectangle: Rounded Corners 449">
+                <a:extLst>
+                  <a:ext uri="{FF2B5EF4-FFF2-40B4-BE49-F238E27FC236}">
+                    <a16:creationId xmlns:a16="http://schemas.microsoft.com/office/drawing/2014/main" id="{697C3231-624A-1F92-9EE5-1E12A96AE600}"/>
+                  </a:ext>
+                </a:extLst>
+              </p:cNvPr>
+              <p:cNvSpPr/>
+              <p:nvPr/>
+            </p:nvSpPr>
+            <p:spPr>
+              <a:xfrm>
+                <a:off x="5550837" y="4008693"/>
+                <a:ext cx="47777" cy="237376"/>
+              </a:xfrm>
+              <a:prstGeom prst="roundRect">
+                <a:avLst>
+                  <a:gd name="adj" fmla="val 50000"/>
+                </a:avLst>
+              </a:prstGeom>
+              <a:solidFill>
+                <a:srgbClr val="FF0000"/>
+              </a:solidFill>
+              <a:ln w="19050" cap="flat">
+                <a:solidFill>
+                  <a:schemeClr val="tx1"/>
+                </a:solidFill>
+                <a:prstDash val="solid"/>
+                <a:round/>
+              </a:ln>
+            </p:spPr>
+            <p:txBody>
+              <a:bodyPr lIns="0" tIns="0" rIns="0" bIns="0" rtlCol="0" anchor="ctr"/>
+              <a:lstStyle/>
+              <a:p>
+                <a:endParaRPr lang="en-CA" sz="1000">
+                  <a:solidFill>
+                    <a:schemeClr val="tx1"/>
+                  </a:solidFill>
+                </a:endParaRPr>
+              </a:p>
+            </p:txBody>
+          </p:sp>
+          <p:sp>
+            <p:nvSpPr>
+              <p:cNvPr id="449" name="Oval 448">
+                <a:extLst>
+                  <a:ext uri="{FF2B5EF4-FFF2-40B4-BE49-F238E27FC236}">
+                    <a16:creationId xmlns:a16="http://schemas.microsoft.com/office/drawing/2014/main" id="{C0A486FA-00EC-4DC7-F323-02894205DAEC}"/>
+                  </a:ext>
+                </a:extLst>
+              </p:cNvPr>
+              <p:cNvSpPr/>
+              <p:nvPr/>
+            </p:nvSpPr>
+            <p:spPr>
+              <a:xfrm>
+                <a:off x="5539578" y="4227065"/>
+                <a:ext cx="72186" cy="72186"/>
+              </a:xfrm>
+              <a:prstGeom prst="ellipse">
+                <a:avLst/>
+              </a:prstGeom>
+              <a:solidFill>
+                <a:schemeClr val="tx1">
+                  <a:lumMod val="75000"/>
+                  <a:lumOff val="25000"/>
+                </a:schemeClr>
+              </a:solidFill>
+              <a:ln w="19050" cap="flat">
+                <a:solidFill>
+                  <a:schemeClr val="tx1"/>
+                </a:solidFill>
+                <a:prstDash val="solid"/>
+                <a:round/>
+              </a:ln>
+            </p:spPr>
+            <p:txBody>
+              <a:bodyPr rot="0" spcFirstLastPara="0" vertOverflow="overflow" horzOverflow="overflow" vert="horz" wrap="square" lIns="0" tIns="0" rIns="0" bIns="0" numCol="1" spcCol="0" rtlCol="0" fromWordArt="0" anchor="ctr" anchorCtr="0" forceAA="0" compatLnSpc="1">
+                <a:prstTxWarp prst="textNoShape">
+                  <a:avLst/>
+                </a:prstTxWarp>
+                <a:noAutofit/>
+              </a:bodyPr>
+              <a:lstStyle/>
+              <a:p>
+                <a:endParaRPr lang="en-CA" sz="1000" dirty="0">
+                  <a:solidFill>
+                    <a:schemeClr val="tx1"/>
+                  </a:solidFill>
+                </a:endParaRPr>
+              </a:p>
+            </p:txBody>
+          </p:sp>
+        </p:grpSp>
+      </p:grpSp>
+      <p:sp>
+        <p:nvSpPr>
+          <p:cNvPr id="456" name="Rectangle 455">
+            <a:extLst>
+              <a:ext uri="{FF2B5EF4-FFF2-40B4-BE49-F238E27FC236}">
+                <a16:creationId xmlns:a16="http://schemas.microsoft.com/office/drawing/2014/main" id="{9E13F0B6-C723-DADA-1256-DF5E19110B2F}"/>
+              </a:ext>
+            </a:extLst>
+          </p:cNvPr>
+          <p:cNvSpPr/>
+          <p:nvPr/>
+        </p:nvSpPr>
+        <p:spPr>
+          <a:xfrm>
+            <a:off x="1402473" y="4669953"/>
+            <a:ext cx="1345924" cy="378592"/>
+          </a:xfrm>
+          <a:prstGeom prst="rect">
+            <a:avLst/>
+          </a:prstGeom>
+          <a:noFill/>
+          <a:ln w="31750">
+            <a:noFill/>
+          </a:ln>
+        </p:spPr>
+        <p:style>
+          <a:lnRef idx="2">
+            <a:schemeClr val="accent1">
+              <a:shade val="50000"/>
+            </a:schemeClr>
+          </a:lnRef>
+          <a:fillRef idx="1">
+            <a:schemeClr val="accent1"/>
+          </a:fillRef>
+          <a:effectRef idx="0">
+            <a:schemeClr val="accent1"/>
+          </a:effectRef>
+          <a:fontRef idx="minor">
+            <a:schemeClr val="lt1"/>
+          </a:fontRef>
+        </p:style>
+        <p:txBody>
+          <a:bodyPr rot="0" spcFirstLastPara="0" vertOverflow="overflow" horzOverflow="overflow" vert="horz" wrap="square" lIns="0" tIns="0" rIns="0" bIns="0" numCol="1" spcCol="0" rtlCol="0" fromWordArt="0" anchor="t" anchorCtr="0" forceAA="0" compatLnSpc="1">
+            <a:prstTxWarp prst="textNoShape">
+              <a:avLst/>
+            </a:prstTxWarp>
+            <a:noAutofit/>
+          </a:bodyPr>
+          <a:lstStyle/>
+          <a:p>
+            <a:pPr algn="ctr"/>
+            <a:r>
+              <a:rPr lang="en-US" sz="1400" dirty="0">
+                <a:solidFill>
+                  <a:schemeClr val="tx1"/>
+                </a:solidFill>
+                <a:latin typeface="Gotham Narrow Book" pitchFamily="50" charset="0"/>
+                <a:ea typeface="Roboto" panose="02000000000000000000" pitchFamily="2" charset="0"/>
+                <a:cs typeface="Arial" panose="020B0604020202020204" pitchFamily="34" charset="0"/>
+              </a:rPr>
+              <a:t>Six jet atomizer</a:t>
+            </a:r>
+            <a:endParaRPr lang="el-GR" sz="1400" dirty="0">
+              <a:solidFill>
+                <a:schemeClr val="tx1"/>
+              </a:solidFill>
+              <a:latin typeface="Gotham Narrow Book" pitchFamily="50" charset="0"/>
+              <a:ea typeface="Roboto" panose="02000000000000000000" pitchFamily="2" charset="0"/>
+              <a:cs typeface="Arial" panose="020B0604020202020204" pitchFamily="34" charset="0"/>
+            </a:endParaRPr>
+          </a:p>
+        </p:txBody>
+      </p:sp>
     </p:spTree>
     <p:extLst>
       <p:ext uri="{BB962C8B-B14F-4D97-AF65-F5344CB8AC3E}">
@@ -23848,7 +25509,7 @@
         </p:nvSpPr>
         <p:spPr>
           <a:xfrm>
-            <a:off x="2538283" y="4886986"/>
+            <a:off x="2503383" y="4886986"/>
             <a:ext cx="1345924" cy="300640"/>
           </a:xfrm>
           <a:prstGeom prst="rect">
@@ -24140,7 +25801,7 @@
         </p:nvGrpSpPr>
         <p:grpSpPr>
           <a:xfrm>
-            <a:off x="2505565" y="3989672"/>
+            <a:off x="2470665" y="3989672"/>
             <a:ext cx="1442896" cy="834119"/>
             <a:chOff x="20512288" y="3594938"/>
             <a:chExt cx="1442896" cy="834119"/>

</xml_diff>